<commit_message>
PLSR test vs train
</commit_message>
<xml_diff>
--- a/Figures/PLSR_val_multiplot.pptx
+++ b/Figures/PLSR_val_multiplot.pptx
@@ -104,7 +104,169 @@
       </a:defRPr>
     </a:lvl9pPr>
   </p:defaultTextStyle>
+  <p:extLst>
+    <p:ext uri="{EFAFB233-063F-42B5-8137-9DF3F51BA10A}">
+      <p15:sldGuideLst xmlns:p15="http://schemas.microsoft.com/office/powerpoint/2012/main"/>
+    </p:ext>
+  </p:extLst>
 </p:presentation>
+</file>
+
+<file path=ppt/revisionInfo.xml><?xml version="1.0" encoding="utf-8"?>
+<p1510:revInfo xmlns:a="http://schemas.openxmlformats.org/drawingml/2006/main" xmlns:r="http://schemas.openxmlformats.org/officeDocument/2006/relationships" xmlns:p1510="http://schemas.microsoft.com/office/powerpoint/2015/10/main">
+  <p1510:revLst>
+    <p1510:client id="{C2733AFB-A3B9-2147-9104-1AD00D84F6D6}" v="10" dt="2024-07-23T17:07:57.992"/>
+  </p1510:revLst>
+</p1510:revInfo>
+</file>
+
+<file path=ppt/changesInfos/changesInfo1.xml><?xml version="1.0" encoding="utf-8"?>
+<pc:chgInfo xmlns:a="http://schemas.openxmlformats.org/drawingml/2006/main" xmlns:r="http://schemas.openxmlformats.org/officeDocument/2006/relationships" xmlns:ac="http://schemas.microsoft.com/office/drawing/2013/main/command" xmlns:pc="http://schemas.microsoft.com/office/powerpoint/2013/main/command">
+  <pc:docChgLst>
+    <pc:chgData name="Anna Jones" userId="0c601e31-7170-4799-a329-02b655c0fef4" providerId="ADAL" clId="{C2733AFB-A3B9-2147-9104-1AD00D84F6D6}"/>
+    <pc:docChg chg="custSel modSld">
+      <pc:chgData name="Anna Jones" userId="0c601e31-7170-4799-a329-02b655c0fef4" providerId="ADAL" clId="{C2733AFB-A3B9-2147-9104-1AD00D84F6D6}" dt="2024-07-23T17:07:57.992" v="37" actId="167"/>
+      <pc:docMkLst>
+        <pc:docMk/>
+      </pc:docMkLst>
+      <pc:sldChg chg="addSp delSp modSp mod">
+        <pc:chgData name="Anna Jones" userId="0c601e31-7170-4799-a329-02b655c0fef4" providerId="ADAL" clId="{C2733AFB-A3B9-2147-9104-1AD00D84F6D6}" dt="2024-07-23T17:07:57.992" v="37" actId="167"/>
+        <pc:sldMkLst>
+          <pc:docMk/>
+          <pc:sldMk cId="1524361614" sldId="256"/>
+        </pc:sldMkLst>
+        <pc:spChg chg="mod">
+          <ac:chgData name="Anna Jones" userId="0c601e31-7170-4799-a329-02b655c0fef4" providerId="ADAL" clId="{C2733AFB-A3B9-2147-9104-1AD00D84F6D6}" dt="2024-07-23T17:07:43.577" v="35" actId="166"/>
+          <ac:spMkLst>
+            <pc:docMk/>
+            <pc:sldMk cId="1524361614" sldId="256"/>
+            <ac:spMk id="9" creationId="{D2CAA15C-C9BD-A1FC-07C7-3473DD2BC5BE}"/>
+          </ac:spMkLst>
+        </pc:spChg>
+        <pc:spChg chg="del">
+          <ac:chgData name="Anna Jones" userId="0c601e31-7170-4799-a329-02b655c0fef4" providerId="ADAL" clId="{C2733AFB-A3B9-2147-9104-1AD00D84F6D6}" dt="2024-07-22T16:39:34.590" v="23" actId="478"/>
+          <ac:spMkLst>
+            <pc:docMk/>
+            <pc:sldMk cId="1524361614" sldId="256"/>
+            <ac:spMk id="10" creationId="{ED576AE8-2F4A-2CEE-0675-75A08CA7AC4A}"/>
+          </ac:spMkLst>
+        </pc:spChg>
+        <pc:spChg chg="del">
+          <ac:chgData name="Anna Jones" userId="0c601e31-7170-4799-a329-02b655c0fef4" providerId="ADAL" clId="{C2733AFB-A3B9-2147-9104-1AD00D84F6D6}" dt="2024-07-22T15:45:40.184" v="19" actId="478"/>
+          <ac:spMkLst>
+            <pc:docMk/>
+            <pc:sldMk cId="1524361614" sldId="256"/>
+            <ac:spMk id="11" creationId="{DFFB732C-8575-893F-CA54-820374159540}"/>
+          </ac:spMkLst>
+        </pc:spChg>
+        <pc:grpChg chg="add">
+          <ac:chgData name="Anna Jones" userId="0c601e31-7170-4799-a329-02b655c0fef4" providerId="ADAL" clId="{C2733AFB-A3B9-2147-9104-1AD00D84F6D6}" dt="2024-07-23T17:07:10.636" v="32" actId="164"/>
+          <ac:grpSpMkLst>
+            <pc:docMk/>
+            <pc:sldMk cId="1524361614" sldId="256"/>
+            <ac:grpSpMk id="5" creationId="{52876BBC-A6B2-7598-E176-4C94254538B2}"/>
+          </ac:grpSpMkLst>
+        </pc:grpChg>
+        <pc:grpChg chg="topLvl">
+          <ac:chgData name="Anna Jones" userId="0c601e31-7170-4799-a329-02b655c0fef4" providerId="ADAL" clId="{C2733AFB-A3B9-2147-9104-1AD00D84F6D6}" dt="2024-07-23T17:06:49.814" v="30" actId="478"/>
+          <ac:grpSpMkLst>
+            <pc:docMk/>
+            <pc:sldMk cId="1524361614" sldId="256"/>
+            <ac:grpSpMk id="13" creationId="{C7202592-8701-F2B6-97AC-59D7D49488D3}"/>
+          </ac:grpSpMkLst>
+        </pc:grpChg>
+        <pc:grpChg chg="add del">
+          <ac:chgData name="Anna Jones" userId="0c601e31-7170-4799-a329-02b655c0fef4" providerId="ADAL" clId="{C2733AFB-A3B9-2147-9104-1AD00D84F6D6}" dt="2024-07-23T17:06:49.814" v="30" actId="478"/>
+          <ac:grpSpMkLst>
+            <pc:docMk/>
+            <pc:sldMk cId="1524361614" sldId="256"/>
+            <ac:grpSpMk id="16" creationId="{4554CAC9-2E06-A74F-E7F6-0C0F6E809E42}"/>
+          </ac:grpSpMkLst>
+        </pc:grpChg>
+        <pc:picChg chg="add mod">
+          <ac:chgData name="Anna Jones" userId="0c601e31-7170-4799-a329-02b655c0fef4" providerId="ADAL" clId="{C2733AFB-A3B9-2147-9104-1AD00D84F6D6}" dt="2024-07-23T17:07:57.992" v="37" actId="167"/>
+          <ac:picMkLst>
+            <pc:docMk/>
+            <pc:sldMk cId="1524361614" sldId="256"/>
+            <ac:picMk id="2" creationId="{71ED49E5-DBF4-5179-7A2F-BEB9FB628E39}"/>
+          </ac:picMkLst>
+        </pc:picChg>
+        <pc:picChg chg="add mod">
+          <ac:chgData name="Anna Jones" userId="0c601e31-7170-4799-a329-02b655c0fef4" providerId="ADAL" clId="{C2733AFB-A3B9-2147-9104-1AD00D84F6D6}" dt="2024-07-22T15:42:30.563" v="2"/>
+          <ac:picMkLst>
+            <pc:docMk/>
+            <pc:sldMk cId="1524361614" sldId="256"/>
+            <ac:picMk id="2" creationId="{B96E9267-75B9-AA35-BB13-D96FF168C7CB}"/>
+          </ac:picMkLst>
+        </pc:picChg>
+        <pc:picChg chg="add mod">
+          <ac:chgData name="Anna Jones" userId="0c601e31-7170-4799-a329-02b655c0fef4" providerId="ADAL" clId="{C2733AFB-A3B9-2147-9104-1AD00D84F6D6}" dt="2024-07-23T17:07:54.924" v="36" actId="167"/>
+          <ac:picMkLst>
+            <pc:docMk/>
+            <pc:sldMk cId="1524361614" sldId="256"/>
+            <ac:picMk id="4" creationId="{518B7DDD-C103-663D-08A4-E43EB7B5B8D7}"/>
+          </ac:picMkLst>
+        </pc:picChg>
+        <pc:picChg chg="del">
+          <ac:chgData name="Anna Jones" userId="0c601e31-7170-4799-a329-02b655c0fef4" providerId="ADAL" clId="{C2733AFB-A3B9-2147-9104-1AD00D84F6D6}" dt="2024-07-22T15:42:27.463" v="0" actId="478"/>
+          <ac:picMkLst>
+            <pc:docMk/>
+            <pc:sldMk cId="1524361614" sldId="256"/>
+            <ac:picMk id="4" creationId="{5DD9B827-7351-A83E-104C-9892E7E3BDD9}"/>
+          </ac:picMkLst>
+        </pc:picChg>
+        <pc:picChg chg="del">
+          <ac:chgData name="Anna Jones" userId="0c601e31-7170-4799-a329-02b655c0fef4" providerId="ADAL" clId="{C2733AFB-A3B9-2147-9104-1AD00D84F6D6}" dt="2024-07-22T15:42:54.569" v="6" actId="478"/>
+          <ac:picMkLst>
+            <pc:docMk/>
+            <pc:sldMk cId="1524361614" sldId="256"/>
+            <ac:picMk id="5" creationId="{616F0E4D-E71D-7CB5-000D-F177CDB87D09}"/>
+          </ac:picMkLst>
+        </pc:picChg>
+        <pc:picChg chg="del">
+          <ac:chgData name="Anna Jones" userId="0c601e31-7170-4799-a329-02b655c0fef4" providerId="ADAL" clId="{C2733AFB-A3B9-2147-9104-1AD00D84F6D6}" dt="2024-07-22T15:45:20.344" v="14" actId="478"/>
+          <ac:picMkLst>
+            <pc:docMk/>
+            <pc:sldMk cId="1524361614" sldId="256"/>
+            <ac:picMk id="6" creationId="{2FAECC41-750B-5077-B817-3367A1A77DB7}"/>
+          </ac:picMkLst>
+        </pc:picChg>
+        <pc:picChg chg="del">
+          <ac:chgData name="Anna Jones" userId="0c601e31-7170-4799-a329-02b655c0fef4" providerId="ADAL" clId="{C2733AFB-A3B9-2147-9104-1AD00D84F6D6}" dt="2024-07-22T15:45:36.037" v="18" actId="478"/>
+          <ac:picMkLst>
+            <pc:docMk/>
+            <pc:sldMk cId="1524361614" sldId="256"/>
+            <ac:picMk id="7" creationId="{2C91C0FC-C14A-EFAA-3181-6B9A78F81AD6}"/>
+          </ac:picMkLst>
+        </pc:picChg>
+        <pc:picChg chg="add del mod">
+          <ac:chgData name="Anna Jones" userId="0c601e31-7170-4799-a329-02b655c0fef4" providerId="ADAL" clId="{C2733AFB-A3B9-2147-9104-1AD00D84F6D6}" dt="2024-07-23T17:06:07.465" v="26" actId="478"/>
+          <ac:picMkLst>
+            <pc:docMk/>
+            <pc:sldMk cId="1524361614" sldId="256"/>
+            <ac:picMk id="12" creationId="{0EAD2D92-71E0-B625-C509-393BAB29AE0F}"/>
+          </ac:picMkLst>
+        </pc:picChg>
+        <pc:picChg chg="add del mod topLvl">
+          <ac:chgData name="Anna Jones" userId="0c601e31-7170-4799-a329-02b655c0fef4" providerId="ADAL" clId="{C2733AFB-A3B9-2147-9104-1AD00D84F6D6}" dt="2024-07-23T17:06:49.814" v="30" actId="478"/>
+          <ac:picMkLst>
+            <pc:docMk/>
+            <pc:sldMk cId="1524361614" sldId="256"/>
+            <ac:picMk id="14" creationId="{5249668B-D1AA-BA07-C65C-D397364BD11C}"/>
+          </ac:picMkLst>
+        </pc:picChg>
+        <pc:picChg chg="add del mod">
+          <ac:chgData name="Anna Jones" userId="0c601e31-7170-4799-a329-02b655c0fef4" providerId="ADAL" clId="{C2733AFB-A3B9-2147-9104-1AD00D84F6D6}" dt="2024-07-22T16:39:31.064" v="22" actId="478"/>
+          <ac:picMkLst>
+            <pc:docMk/>
+            <pc:sldMk cId="1524361614" sldId="256"/>
+            <ac:picMk id="15" creationId="{885C3C6F-C1B8-AB91-34CE-04BBB3E07DB1}"/>
+          </ac:picMkLst>
+        </pc:picChg>
+      </pc:sldChg>
+    </pc:docChg>
+  </pc:docChgLst>
+</pc:chgInfo>
 </file>
 
 <file path=ppt/slideLayouts/slideLayout1.xml><?xml version="1.0" encoding="utf-8"?>
@@ -256,7 +418,7 @@
           <a:p>
             <a:fld id="{AC8DD5E8-AF27-094F-A48B-307F7642937F}" type="datetimeFigureOut">
               <a:rPr lang="en-US" smtClean="0"/>
-              <a:t>7/19/24</a:t>
+              <a:t>7/23/24</a:t>
             </a:fld>
             <a:endParaRPr lang="en-US"/>
           </a:p>
@@ -456,7 +618,7 @@
           <a:p>
             <a:fld id="{AC8DD5E8-AF27-094F-A48B-307F7642937F}" type="datetimeFigureOut">
               <a:rPr lang="en-US" smtClean="0"/>
-              <a:t>7/19/24</a:t>
+              <a:t>7/23/24</a:t>
             </a:fld>
             <a:endParaRPr lang="en-US"/>
           </a:p>
@@ -666,7 +828,7 @@
           <a:p>
             <a:fld id="{AC8DD5E8-AF27-094F-A48B-307F7642937F}" type="datetimeFigureOut">
               <a:rPr lang="en-US" smtClean="0"/>
-              <a:t>7/19/24</a:t>
+              <a:t>7/23/24</a:t>
             </a:fld>
             <a:endParaRPr lang="en-US"/>
           </a:p>
@@ -866,7 +1028,7 @@
           <a:p>
             <a:fld id="{AC8DD5E8-AF27-094F-A48B-307F7642937F}" type="datetimeFigureOut">
               <a:rPr lang="en-US" smtClean="0"/>
-              <a:t>7/19/24</a:t>
+              <a:t>7/23/24</a:t>
             </a:fld>
             <a:endParaRPr lang="en-US"/>
           </a:p>
@@ -1142,7 +1304,7 @@
           <a:p>
             <a:fld id="{AC8DD5E8-AF27-094F-A48B-307F7642937F}" type="datetimeFigureOut">
               <a:rPr lang="en-US" smtClean="0"/>
-              <a:t>7/19/24</a:t>
+              <a:t>7/23/24</a:t>
             </a:fld>
             <a:endParaRPr lang="en-US"/>
           </a:p>
@@ -1410,7 +1572,7 @@
           <a:p>
             <a:fld id="{AC8DD5E8-AF27-094F-A48B-307F7642937F}" type="datetimeFigureOut">
               <a:rPr lang="en-US" smtClean="0"/>
-              <a:t>7/19/24</a:t>
+              <a:t>7/23/24</a:t>
             </a:fld>
             <a:endParaRPr lang="en-US"/>
           </a:p>
@@ -1825,7 +1987,7 @@
           <a:p>
             <a:fld id="{AC8DD5E8-AF27-094F-A48B-307F7642937F}" type="datetimeFigureOut">
               <a:rPr lang="en-US" smtClean="0"/>
-              <a:t>7/19/24</a:t>
+              <a:t>7/23/24</a:t>
             </a:fld>
             <a:endParaRPr lang="en-US"/>
           </a:p>
@@ -1967,7 +2129,7 @@
           <a:p>
             <a:fld id="{AC8DD5E8-AF27-094F-A48B-307F7642937F}" type="datetimeFigureOut">
               <a:rPr lang="en-US" smtClean="0"/>
-              <a:t>7/19/24</a:t>
+              <a:t>7/23/24</a:t>
             </a:fld>
             <a:endParaRPr lang="en-US"/>
           </a:p>
@@ -2080,7 +2242,7 @@
           <a:p>
             <a:fld id="{AC8DD5E8-AF27-094F-A48B-307F7642937F}" type="datetimeFigureOut">
               <a:rPr lang="en-US" smtClean="0"/>
-              <a:t>7/19/24</a:t>
+              <a:t>7/23/24</a:t>
             </a:fld>
             <a:endParaRPr lang="en-US"/>
           </a:p>
@@ -2393,7 +2555,7 @@
           <a:p>
             <a:fld id="{AC8DD5E8-AF27-094F-A48B-307F7642937F}" type="datetimeFigureOut">
               <a:rPr lang="en-US" smtClean="0"/>
-              <a:t>7/19/24</a:t>
+              <a:t>7/23/24</a:t>
             </a:fld>
             <a:endParaRPr lang="en-US"/>
           </a:p>
@@ -2682,7 +2844,7 @@
           <a:p>
             <a:fld id="{AC8DD5E8-AF27-094F-A48B-307F7642937F}" type="datetimeFigureOut">
               <a:rPr lang="en-US" smtClean="0"/>
-              <a:t>7/19/24</a:t>
+              <a:t>7/23/24</a:t>
             </a:fld>
             <a:endParaRPr lang="en-US"/>
           </a:p>
@@ -2925,7 +3087,7 @@
           <a:p>
             <a:fld id="{AC8DD5E8-AF27-094F-A48B-307F7642937F}" type="datetimeFigureOut">
               <a:rPr lang="en-US" smtClean="0"/>
-              <a:t>7/19/24</a:t>
+              <a:t>7/23/24</a:t>
             </a:fld>
             <a:endParaRPr lang="en-US"/>
           </a:p>
@@ -3380,10 +3542,10 @@
       </p:sp>
       <p:grpSp>
         <p:nvGrpSpPr>
-          <p:cNvPr id="13" name="Group 12">
-            <a:extLst>
-              <a:ext uri="{FF2B5EF4-FFF2-40B4-BE49-F238E27FC236}">
-                <a16:creationId xmlns:a16="http://schemas.microsoft.com/office/drawing/2014/main" id="{C7202592-8701-F2B6-97AC-59D7D49488D3}"/>
+          <p:cNvPr id="5" name="Group 4">
+            <a:extLst>
+              <a:ext uri="{FF2B5EF4-FFF2-40B4-BE49-F238E27FC236}">
+                <a16:creationId xmlns:a16="http://schemas.microsoft.com/office/drawing/2014/main" id="{52876BBC-A6B2-7598-E176-4C94254538B2}"/>
               </a:ext>
             </a:extLst>
           </p:cNvPr>
@@ -3392,18 +3554,18 @@
         </p:nvGrpSpPr>
         <p:grpSpPr>
           <a:xfrm>
-            <a:off x="2798407" y="685801"/>
-            <a:ext cx="6595185" cy="6172201"/>
-            <a:chOff x="1605840" y="685799"/>
-            <a:chExt cx="6980067" cy="6391272"/>
+            <a:off x="2760994" y="685802"/>
+            <a:ext cx="6748126" cy="3022904"/>
+            <a:chOff x="2760994" y="685802"/>
+            <a:chExt cx="6748126" cy="3022904"/>
           </a:xfrm>
         </p:grpSpPr>
         <p:pic>
           <p:nvPicPr>
-            <p:cNvPr id="4" name="Picture 3" descr="A graph of a number of components&#10;&#10;Description automatically generated">
+            <p:cNvPr id="2" name="Picture 1">
               <a:extLst>
                 <a:ext uri="{FF2B5EF4-FFF2-40B4-BE49-F238E27FC236}">
-                  <a16:creationId xmlns:a16="http://schemas.microsoft.com/office/drawing/2014/main" id="{5DD9B827-7351-A83E-104C-9892E7E3BDD9}"/>
+                  <a16:creationId xmlns:a16="http://schemas.microsoft.com/office/drawing/2014/main" id="{71ED49E5-DBF4-5179-7A2F-BEB9FB628E39}"/>
                 </a:ext>
               </a:extLst>
             </p:cNvPr>
@@ -3420,8 +3582,8 @@
           </p:blipFill>
           <p:spPr>
             <a:xfrm>
-              <a:off x="1605841" y="685800"/>
-              <a:ext cx="3490033" cy="3238499"/>
+              <a:off x="2760994" y="860901"/>
+              <a:ext cx="3335006" cy="2847805"/>
             </a:xfrm>
             <a:prstGeom prst="rect">
               <a:avLst/>
@@ -3430,10 +3592,10 @@
         </p:pic>
         <p:pic>
           <p:nvPicPr>
-            <p:cNvPr id="5" name="Picture 4">
+            <p:cNvPr id="4" name="Picture 3">
               <a:extLst>
                 <a:ext uri="{FF2B5EF4-FFF2-40B4-BE49-F238E27FC236}">
-                  <a16:creationId xmlns:a16="http://schemas.microsoft.com/office/drawing/2014/main" id="{616F0E4D-E71D-7CB5-000D-F177CDB87D09}"/>
+                  <a16:creationId xmlns:a16="http://schemas.microsoft.com/office/drawing/2014/main" id="{518B7DDD-C103-663D-08A4-E43EB7B5B8D7}"/>
                 </a:ext>
               </a:extLst>
             </p:cNvPr>
@@ -3450,214 +3612,105 @@
           </p:blipFill>
           <p:spPr>
             <a:xfrm>
-              <a:off x="5095874" y="685799"/>
-              <a:ext cx="3490033" cy="3238499"/>
+              <a:off x="6174115" y="860901"/>
+              <a:ext cx="3335005" cy="2847805"/>
             </a:xfrm>
             <a:prstGeom prst="rect">
               <a:avLst/>
             </a:prstGeom>
           </p:spPr>
         </p:pic>
-        <p:pic>
-          <p:nvPicPr>
-            <p:cNvPr id="6" name="Picture 5">
+        <p:grpSp>
+          <p:nvGrpSpPr>
+            <p:cNvPr id="13" name="Group 12">
               <a:extLst>
                 <a:ext uri="{FF2B5EF4-FFF2-40B4-BE49-F238E27FC236}">
-                  <a16:creationId xmlns:a16="http://schemas.microsoft.com/office/drawing/2014/main" id="{2FAECC41-750B-5077-B817-3367A1A77DB7}"/>
+                  <a16:creationId xmlns:a16="http://schemas.microsoft.com/office/drawing/2014/main" id="{C7202592-8701-F2B6-97AC-59D7D49488D3}"/>
                 </a:ext>
               </a:extLst>
             </p:cNvPr>
-            <p:cNvPicPr>
-              <a:picLocks noChangeAspect="1"/>
-            </p:cNvPicPr>
+            <p:cNvGrpSpPr/>
             <p:nvPr/>
-          </p:nvPicPr>
-          <p:blipFill>
-            <a:blip r:embed="rId4"/>
-            <a:stretch>
-              <a:fillRect/>
-            </a:stretch>
-          </p:blipFill>
-          <p:spPr>
+          </p:nvGrpSpPr>
+          <p:grpSpPr>
             <a:xfrm>
-              <a:off x="1605840" y="3838572"/>
-              <a:ext cx="3490033" cy="3238499"/>
+              <a:off x="2943494" y="685802"/>
+              <a:ext cx="3532333" cy="356673"/>
+              <a:chOff x="1759394" y="685799"/>
+              <a:chExt cx="3738473" cy="369332"/>
             </a:xfrm>
-            <a:prstGeom prst="rect">
-              <a:avLst/>
-            </a:prstGeom>
-          </p:spPr>
-        </p:pic>
-        <p:pic>
-          <p:nvPicPr>
-            <p:cNvPr id="7" name="Picture 6">
-              <a:extLst>
-                <a:ext uri="{FF2B5EF4-FFF2-40B4-BE49-F238E27FC236}">
-                  <a16:creationId xmlns:a16="http://schemas.microsoft.com/office/drawing/2014/main" id="{2C91C0FC-C14A-EFAA-3181-6B9A78F81AD6}"/>
-                </a:ext>
-              </a:extLst>
-            </p:cNvPr>
-            <p:cNvPicPr>
-              <a:picLocks noChangeAspect="1"/>
-            </p:cNvPicPr>
-            <p:nvPr/>
-          </p:nvPicPr>
-          <p:blipFill>
-            <a:blip r:embed="rId5"/>
-            <a:stretch>
-              <a:fillRect/>
-            </a:stretch>
-          </p:blipFill>
-          <p:spPr>
-            <a:xfrm>
-              <a:off x="5095873" y="3838571"/>
-              <a:ext cx="3490033" cy="3238499"/>
-            </a:xfrm>
-            <a:prstGeom prst="rect">
-              <a:avLst/>
-            </a:prstGeom>
-          </p:spPr>
-        </p:pic>
-        <p:sp>
-          <p:nvSpPr>
-            <p:cNvPr id="8" name="TextBox 7">
-              <a:extLst>
-                <a:ext uri="{FF2B5EF4-FFF2-40B4-BE49-F238E27FC236}">
-                  <a16:creationId xmlns:a16="http://schemas.microsoft.com/office/drawing/2014/main" id="{7E893FC4-4CDE-4803-3EA1-56E199AD5E07}"/>
-                </a:ext>
-              </a:extLst>
-            </p:cNvPr>
-            <p:cNvSpPr txBox="1"/>
-            <p:nvPr/>
-          </p:nvSpPr>
-          <p:spPr>
-            <a:xfrm>
-              <a:off x="1759394" y="685799"/>
-              <a:ext cx="311304" cy="369332"/>
-            </a:xfrm>
-            <a:prstGeom prst="rect">
-              <a:avLst/>
-            </a:prstGeom>
-            <a:noFill/>
-          </p:spPr>
-          <p:txBody>
-            <a:bodyPr wrap="none" rtlCol="0">
-              <a:spAutoFit/>
-            </a:bodyPr>
-            <a:lstStyle/>
-            <a:p>
-              <a:r>
-                <a:rPr lang="en-US" b="1" dirty="0"/>
-                <a:t>a</a:t>
-              </a:r>
-            </a:p>
-          </p:txBody>
-        </p:sp>
-        <p:sp>
-          <p:nvSpPr>
-            <p:cNvPr id="9" name="TextBox 8">
-              <a:extLst>
-                <a:ext uri="{FF2B5EF4-FFF2-40B4-BE49-F238E27FC236}">
-                  <a16:creationId xmlns:a16="http://schemas.microsoft.com/office/drawing/2014/main" id="{D2CAA15C-C9BD-A1FC-07C7-3473DD2BC5BE}"/>
-                </a:ext>
-              </a:extLst>
-            </p:cNvPr>
-            <p:cNvSpPr txBox="1"/>
-            <p:nvPr/>
-          </p:nvSpPr>
-          <p:spPr>
-            <a:xfrm>
-              <a:off x="5178549" y="685799"/>
-              <a:ext cx="319318" cy="369332"/>
-            </a:xfrm>
-            <a:prstGeom prst="rect">
-              <a:avLst/>
-            </a:prstGeom>
-            <a:noFill/>
-          </p:spPr>
-          <p:txBody>
-            <a:bodyPr wrap="none" rtlCol="0">
-              <a:spAutoFit/>
-            </a:bodyPr>
-            <a:lstStyle/>
-            <a:p>
-              <a:r>
-                <a:rPr lang="en-US" b="1" dirty="0"/>
-                <a:t>b</a:t>
-              </a:r>
-            </a:p>
-          </p:txBody>
-        </p:sp>
-        <p:sp>
-          <p:nvSpPr>
-            <p:cNvPr id="10" name="TextBox 9">
-              <a:extLst>
-                <a:ext uri="{FF2B5EF4-FFF2-40B4-BE49-F238E27FC236}">
-                  <a16:creationId xmlns:a16="http://schemas.microsoft.com/office/drawing/2014/main" id="{ED576AE8-2F4A-2CEE-0675-75A08CA7AC4A}"/>
-                </a:ext>
-              </a:extLst>
-            </p:cNvPr>
-            <p:cNvSpPr txBox="1"/>
-            <p:nvPr/>
-          </p:nvSpPr>
-          <p:spPr>
-            <a:xfrm>
-              <a:off x="1759394" y="3924298"/>
-              <a:ext cx="311304" cy="369332"/>
-            </a:xfrm>
-            <a:prstGeom prst="rect">
-              <a:avLst/>
-            </a:prstGeom>
-            <a:noFill/>
-          </p:spPr>
-          <p:txBody>
-            <a:bodyPr wrap="none" rtlCol="0">
-              <a:spAutoFit/>
-            </a:bodyPr>
-            <a:lstStyle/>
-            <a:p>
-              <a:r>
-                <a:rPr lang="en-US" b="1" dirty="0"/>
-                <a:t>c</a:t>
-              </a:r>
-            </a:p>
-          </p:txBody>
-        </p:sp>
-        <p:sp>
-          <p:nvSpPr>
-            <p:cNvPr id="11" name="TextBox 10">
-              <a:extLst>
-                <a:ext uri="{FF2B5EF4-FFF2-40B4-BE49-F238E27FC236}">
-                  <a16:creationId xmlns:a16="http://schemas.microsoft.com/office/drawing/2014/main" id="{DFFB732C-8575-893F-CA54-820374159540}"/>
-                </a:ext>
-              </a:extLst>
-            </p:cNvPr>
-            <p:cNvSpPr txBox="1"/>
-            <p:nvPr/>
-          </p:nvSpPr>
-          <p:spPr>
-            <a:xfrm>
-              <a:off x="5182556" y="3924298"/>
-              <a:ext cx="319318" cy="369332"/>
-            </a:xfrm>
-            <a:prstGeom prst="rect">
-              <a:avLst/>
-            </a:prstGeom>
-            <a:noFill/>
-          </p:spPr>
-          <p:txBody>
-            <a:bodyPr wrap="none" rtlCol="0">
-              <a:spAutoFit/>
-            </a:bodyPr>
-            <a:lstStyle/>
-            <a:p>
-              <a:r>
-                <a:rPr lang="en-US" b="1" dirty="0"/>
-                <a:t>d</a:t>
-              </a:r>
-            </a:p>
-          </p:txBody>
-        </p:sp>
+          </p:grpSpPr>
+          <p:sp>
+            <p:nvSpPr>
+              <p:cNvPr id="8" name="TextBox 7">
+                <a:extLst>
+                  <a:ext uri="{FF2B5EF4-FFF2-40B4-BE49-F238E27FC236}">
+                    <a16:creationId xmlns:a16="http://schemas.microsoft.com/office/drawing/2014/main" id="{7E893FC4-4CDE-4803-3EA1-56E199AD5E07}"/>
+                  </a:ext>
+                </a:extLst>
+              </p:cNvPr>
+              <p:cNvSpPr txBox="1"/>
+              <p:nvPr/>
+            </p:nvSpPr>
+            <p:spPr>
+              <a:xfrm>
+                <a:off x="1759394" y="685799"/>
+                <a:ext cx="311304" cy="369332"/>
+              </a:xfrm>
+              <a:prstGeom prst="rect">
+                <a:avLst/>
+              </a:prstGeom>
+              <a:noFill/>
+            </p:spPr>
+            <p:txBody>
+              <a:bodyPr wrap="none" rtlCol="0">
+                <a:spAutoFit/>
+              </a:bodyPr>
+              <a:lstStyle/>
+              <a:p>
+                <a:r>
+                  <a:rPr lang="en-US" b="1" dirty="0"/>
+                  <a:t>a</a:t>
+                </a:r>
+              </a:p>
+            </p:txBody>
+          </p:sp>
+          <p:sp>
+            <p:nvSpPr>
+              <p:cNvPr id="9" name="TextBox 8">
+                <a:extLst>
+                  <a:ext uri="{FF2B5EF4-FFF2-40B4-BE49-F238E27FC236}">
+                    <a16:creationId xmlns:a16="http://schemas.microsoft.com/office/drawing/2014/main" id="{D2CAA15C-C9BD-A1FC-07C7-3473DD2BC5BE}"/>
+                  </a:ext>
+                </a:extLst>
+              </p:cNvPr>
+              <p:cNvSpPr txBox="1"/>
+              <p:nvPr/>
+            </p:nvSpPr>
+            <p:spPr>
+              <a:xfrm>
+                <a:off x="5178549" y="685799"/>
+                <a:ext cx="319318" cy="369332"/>
+              </a:xfrm>
+              <a:prstGeom prst="rect">
+                <a:avLst/>
+              </a:prstGeom>
+              <a:noFill/>
+            </p:spPr>
+            <p:txBody>
+              <a:bodyPr wrap="none" rtlCol="0">
+                <a:spAutoFit/>
+              </a:bodyPr>
+              <a:lstStyle/>
+              <a:p>
+                <a:r>
+                  <a:rPr lang="en-US" b="1" dirty="0"/>
+                  <a:t>b</a:t>
+                </a:r>
+              </a:p>
+            </p:txBody>
+          </p:sp>
+        </p:grpSp>
       </p:grpSp>
     </p:spTree>
     <p:extLst>

</xml_diff>

<commit_message>
Style tweaks to figures for paper
</commit_message>
<xml_diff>
--- a/Figures/PLSR_val_multiplot.pptx
+++ b/Figures/PLSR_val_multiplot.pptx
@@ -115,13 +115,109 @@
 <file path=ppt/revisionInfo.xml><?xml version="1.0" encoding="utf-8"?>
 <p1510:revInfo xmlns:a="http://schemas.openxmlformats.org/drawingml/2006/main" xmlns:r="http://schemas.openxmlformats.org/officeDocument/2006/relationships" xmlns:p1510="http://schemas.microsoft.com/office/powerpoint/2015/10/main">
   <p1510:revLst>
-    <p1510:client id="{C2733AFB-A3B9-2147-9104-1AD00D84F6D6}" v="10" dt="2024-07-23T17:07:57.992"/>
+    <p1510:client id="{1A1C7449-C669-9344-AD7B-91C4B5677F2C}" v="7" dt="2024-09-12T12:12:11.113"/>
   </p1510:revLst>
 </p1510:revInfo>
 </file>
 
 <file path=ppt/changesInfos/changesInfo1.xml><?xml version="1.0" encoding="utf-8"?>
 <pc:chgInfo xmlns:a="http://schemas.openxmlformats.org/drawingml/2006/main" xmlns:r="http://schemas.openxmlformats.org/officeDocument/2006/relationships" xmlns:ac="http://schemas.microsoft.com/office/drawing/2013/main/command" xmlns:pc="http://schemas.microsoft.com/office/powerpoint/2013/main/command">
+  <pc:docChgLst>
+    <pc:chgData name="Anna Jones" userId="0c601e31-7170-4799-a329-02b655c0fef4" providerId="ADAL" clId="{1A1C7449-C669-9344-AD7B-91C4B5677F2C}"/>
+    <pc:docChg chg="undo custSel modSld">
+      <pc:chgData name="Anna Jones" userId="0c601e31-7170-4799-a329-02b655c0fef4" providerId="ADAL" clId="{1A1C7449-C669-9344-AD7B-91C4B5677F2C}" dt="2024-09-12T12:12:17.227" v="24" actId="164"/>
+      <pc:docMkLst>
+        <pc:docMk/>
+      </pc:docMkLst>
+      <pc:sldChg chg="addSp delSp modSp mod">
+        <pc:chgData name="Anna Jones" userId="0c601e31-7170-4799-a329-02b655c0fef4" providerId="ADAL" clId="{1A1C7449-C669-9344-AD7B-91C4B5677F2C}" dt="2024-09-12T12:12:17.227" v="24" actId="164"/>
+        <pc:sldMkLst>
+          <pc:docMk/>
+          <pc:sldMk cId="1524361614" sldId="256"/>
+        </pc:sldMkLst>
+        <pc:spChg chg="del">
+          <ac:chgData name="Anna Jones" userId="0c601e31-7170-4799-a329-02b655c0fef4" providerId="ADAL" clId="{1A1C7449-C669-9344-AD7B-91C4B5677F2C}" dt="2024-09-12T10:59:10.310" v="6" actId="478"/>
+          <ac:spMkLst>
+            <pc:docMk/>
+            <pc:sldMk cId="1524361614" sldId="256"/>
+            <ac:spMk id="3" creationId="{C18A26C7-5863-82A5-53F5-4A1C63A6CA17}"/>
+          </ac:spMkLst>
+        </pc:spChg>
+        <pc:spChg chg="add del mod">
+          <ac:chgData name="Anna Jones" userId="0c601e31-7170-4799-a329-02b655c0fef4" providerId="ADAL" clId="{1A1C7449-C669-9344-AD7B-91C4B5677F2C}" dt="2024-09-12T10:59:13.481" v="8" actId="478"/>
+          <ac:spMkLst>
+            <pc:docMk/>
+            <pc:sldMk cId="1524361614" sldId="256"/>
+            <ac:spMk id="11" creationId="{9020DB2B-FB7A-92E3-C7E3-12556CEB4D4E}"/>
+          </ac:spMkLst>
+        </pc:spChg>
+        <pc:grpChg chg="add">
+          <ac:chgData name="Anna Jones" userId="0c601e31-7170-4799-a329-02b655c0fef4" providerId="ADAL" clId="{1A1C7449-C669-9344-AD7B-91C4B5677F2C}" dt="2024-09-12T12:12:17.227" v="24" actId="164"/>
+          <ac:grpSpMkLst>
+            <pc:docMk/>
+            <pc:sldMk cId="1524361614" sldId="256"/>
+            <ac:grpSpMk id="4" creationId="{B74A2EFC-FC66-3828-DDDA-576A9A8D7844}"/>
+          </ac:grpSpMkLst>
+        </pc:grpChg>
+        <pc:grpChg chg="del">
+          <ac:chgData name="Anna Jones" userId="0c601e31-7170-4799-a329-02b655c0fef4" providerId="ADAL" clId="{1A1C7449-C669-9344-AD7B-91C4B5677F2C}" dt="2024-09-12T10:59:10.310" v="6" actId="478"/>
+          <ac:grpSpMkLst>
+            <pc:docMk/>
+            <pc:sldMk cId="1524361614" sldId="256"/>
+            <ac:grpSpMk id="5" creationId="{52876BBC-A6B2-7598-E176-4C94254538B2}"/>
+          </ac:grpSpMkLst>
+        </pc:grpChg>
+        <pc:grpChg chg="add del">
+          <ac:chgData name="Anna Jones" userId="0c601e31-7170-4799-a329-02b655c0fef4" providerId="ADAL" clId="{1A1C7449-C669-9344-AD7B-91C4B5677F2C}" dt="2024-09-12T12:11:54.671" v="19" actId="478"/>
+          <ac:grpSpMkLst>
+            <pc:docMk/>
+            <pc:sldMk cId="1524361614" sldId="256"/>
+            <ac:grpSpMk id="15" creationId="{38E70176-466F-4DBB-7684-A8A824C5B429}"/>
+          </ac:grpSpMkLst>
+        </pc:grpChg>
+        <pc:picChg chg="add mod">
+          <ac:chgData name="Anna Jones" userId="0c601e31-7170-4799-a329-02b655c0fef4" providerId="ADAL" clId="{1A1C7449-C669-9344-AD7B-91C4B5677F2C}" dt="2024-09-12T12:11:52.080" v="18"/>
+          <ac:picMkLst>
+            <pc:docMk/>
+            <pc:sldMk cId="1524361614" sldId="256"/>
+            <ac:picMk id="2" creationId="{AB4B96DD-A64A-8F03-4A05-60A3FA32A157}"/>
+          </ac:picMkLst>
+        </pc:picChg>
+        <pc:picChg chg="add mod">
+          <ac:chgData name="Anna Jones" userId="0c601e31-7170-4799-a329-02b655c0fef4" providerId="ADAL" clId="{1A1C7449-C669-9344-AD7B-91C4B5677F2C}" dt="2024-09-12T12:12:11.113" v="23" actId="167"/>
+          <ac:picMkLst>
+            <pc:docMk/>
+            <pc:sldMk cId="1524361614" sldId="256"/>
+            <ac:picMk id="3" creationId="{1671EEF2-1AE9-274E-9988-285F4BD6384F}"/>
+          </ac:picMkLst>
+        </pc:picChg>
+        <pc:picChg chg="add del mod">
+          <ac:chgData name="Anna Jones" userId="0c601e31-7170-4799-a329-02b655c0fef4" providerId="ADAL" clId="{1A1C7449-C669-9344-AD7B-91C4B5677F2C}" dt="2024-09-12T10:59:10.310" v="6" actId="478"/>
+          <ac:picMkLst>
+            <pc:docMk/>
+            <pc:sldMk cId="1524361614" sldId="256"/>
+            <ac:picMk id="7" creationId="{E9D42CBB-83F8-193B-40C4-AAB54C2AF631}"/>
+          </ac:picMkLst>
+        </pc:picChg>
+        <pc:picChg chg="add del mod topLvl">
+          <ac:chgData name="Anna Jones" userId="0c601e31-7170-4799-a329-02b655c0fef4" providerId="ADAL" clId="{1A1C7449-C669-9344-AD7B-91C4B5677F2C}" dt="2024-09-12T12:11:54.671" v="19" actId="478"/>
+          <ac:picMkLst>
+            <pc:docMk/>
+            <pc:sldMk cId="1524361614" sldId="256"/>
+            <ac:picMk id="12" creationId="{AE021641-250F-71C0-A805-BEB21BF730BE}"/>
+          </ac:picMkLst>
+        </pc:picChg>
+        <pc:picChg chg="add mod topLvl">
+          <ac:chgData name="Anna Jones" userId="0c601e31-7170-4799-a329-02b655c0fef4" providerId="ADAL" clId="{1A1C7449-C669-9344-AD7B-91C4B5677F2C}" dt="2024-09-12T12:11:54.671" v="19" actId="478"/>
+          <ac:picMkLst>
+            <pc:docMk/>
+            <pc:sldMk cId="1524361614" sldId="256"/>
+            <ac:picMk id="14" creationId="{97620366-6658-F6F6-89C4-44C5157DBA16}"/>
+          </ac:picMkLst>
+        </pc:picChg>
+      </pc:sldChg>
+    </pc:docChg>
+  </pc:docChgLst>
   <pc:docChgLst>
     <pc:chgData name="Anna Jones" userId="0c601e31-7170-4799-a329-02b655c0fef4" providerId="ADAL" clId="{C2733AFB-A3B9-2147-9104-1AD00D84F6D6}"/>
     <pc:docChg chg="custSel modSld">
@@ -418,7 +514,7 @@
           <a:p>
             <a:fld id="{AC8DD5E8-AF27-094F-A48B-307F7642937F}" type="datetimeFigureOut">
               <a:rPr lang="en-US" smtClean="0"/>
-              <a:t>7/23/24</a:t>
+              <a:t>9/12/24</a:t>
             </a:fld>
             <a:endParaRPr lang="en-US"/>
           </a:p>
@@ -618,7 +714,7 @@
           <a:p>
             <a:fld id="{AC8DD5E8-AF27-094F-A48B-307F7642937F}" type="datetimeFigureOut">
               <a:rPr lang="en-US" smtClean="0"/>
-              <a:t>7/23/24</a:t>
+              <a:t>9/12/24</a:t>
             </a:fld>
             <a:endParaRPr lang="en-US"/>
           </a:p>
@@ -828,7 +924,7 @@
           <a:p>
             <a:fld id="{AC8DD5E8-AF27-094F-A48B-307F7642937F}" type="datetimeFigureOut">
               <a:rPr lang="en-US" smtClean="0"/>
-              <a:t>7/23/24</a:t>
+              <a:t>9/12/24</a:t>
             </a:fld>
             <a:endParaRPr lang="en-US"/>
           </a:p>
@@ -1028,7 +1124,7 @@
           <a:p>
             <a:fld id="{AC8DD5E8-AF27-094F-A48B-307F7642937F}" type="datetimeFigureOut">
               <a:rPr lang="en-US" smtClean="0"/>
-              <a:t>7/23/24</a:t>
+              <a:t>9/12/24</a:t>
             </a:fld>
             <a:endParaRPr lang="en-US"/>
           </a:p>
@@ -1304,7 +1400,7 @@
           <a:p>
             <a:fld id="{AC8DD5E8-AF27-094F-A48B-307F7642937F}" type="datetimeFigureOut">
               <a:rPr lang="en-US" smtClean="0"/>
-              <a:t>7/23/24</a:t>
+              <a:t>9/12/24</a:t>
             </a:fld>
             <a:endParaRPr lang="en-US"/>
           </a:p>
@@ -1572,7 +1668,7 @@
           <a:p>
             <a:fld id="{AC8DD5E8-AF27-094F-A48B-307F7642937F}" type="datetimeFigureOut">
               <a:rPr lang="en-US" smtClean="0"/>
-              <a:t>7/23/24</a:t>
+              <a:t>9/12/24</a:t>
             </a:fld>
             <a:endParaRPr lang="en-US"/>
           </a:p>
@@ -1987,7 +2083,7 @@
           <a:p>
             <a:fld id="{AC8DD5E8-AF27-094F-A48B-307F7642937F}" type="datetimeFigureOut">
               <a:rPr lang="en-US" smtClean="0"/>
-              <a:t>7/23/24</a:t>
+              <a:t>9/12/24</a:t>
             </a:fld>
             <a:endParaRPr lang="en-US"/>
           </a:p>
@@ -2129,7 +2225,7 @@
           <a:p>
             <a:fld id="{AC8DD5E8-AF27-094F-A48B-307F7642937F}" type="datetimeFigureOut">
               <a:rPr lang="en-US" smtClean="0"/>
-              <a:t>7/23/24</a:t>
+              <a:t>9/12/24</a:t>
             </a:fld>
             <a:endParaRPr lang="en-US"/>
           </a:p>
@@ -2242,7 +2338,7 @@
           <a:p>
             <a:fld id="{AC8DD5E8-AF27-094F-A48B-307F7642937F}" type="datetimeFigureOut">
               <a:rPr lang="en-US" smtClean="0"/>
-              <a:t>7/23/24</a:t>
+              <a:t>9/12/24</a:t>
             </a:fld>
             <a:endParaRPr lang="en-US"/>
           </a:p>
@@ -2555,7 +2651,7 @@
           <a:p>
             <a:fld id="{AC8DD5E8-AF27-094F-A48B-307F7642937F}" type="datetimeFigureOut">
               <a:rPr lang="en-US" smtClean="0"/>
-              <a:t>7/23/24</a:t>
+              <a:t>9/12/24</a:t>
             </a:fld>
             <a:endParaRPr lang="en-US"/>
           </a:p>
@@ -2844,7 +2940,7 @@
           <a:p>
             <a:fld id="{AC8DD5E8-AF27-094F-A48B-307F7642937F}" type="datetimeFigureOut">
               <a:rPr lang="en-US" smtClean="0"/>
-              <a:t>7/23/24</a:t>
+              <a:t>9/12/24</a:t>
             </a:fld>
             <a:endParaRPr lang="en-US"/>
           </a:p>
@@ -3087,7 +3183,7 @@
           <a:p>
             <a:fld id="{AC8DD5E8-AF27-094F-A48B-307F7642937F}" type="datetimeFigureOut">
               <a:rPr lang="en-US" smtClean="0"/>
-              <a:t>7/23/24</a:t>
+              <a:t>9/12/24</a:t>
             </a:fld>
             <a:endParaRPr lang="en-US"/>
           </a:p>
@@ -3504,48 +3600,12 @@
           <a:chExt cx="0" cy="0"/>
         </a:xfrm>
       </p:grpSpPr>
-      <p:sp>
-        <p:nvSpPr>
-          <p:cNvPr id="3" name="Subtitle 2">
-            <a:extLst>
-              <a:ext uri="{FF2B5EF4-FFF2-40B4-BE49-F238E27FC236}">
-                <a16:creationId xmlns:a16="http://schemas.microsoft.com/office/drawing/2014/main" id="{C18A26C7-5863-82A5-53F5-4A1C63A6CA17}"/>
-              </a:ext>
-            </a:extLst>
-          </p:cNvPr>
-          <p:cNvSpPr>
-            <a:spLocks noGrp="1"/>
-          </p:cNvSpPr>
-          <p:nvPr>
-            <p:ph type="subTitle" idx="1"/>
-          </p:nvPr>
-        </p:nvSpPr>
-        <p:spPr>
-          <a:xfrm>
-            <a:off x="1524000" y="273051"/>
-            <a:ext cx="9144000" cy="412750"/>
-          </a:xfrm>
-        </p:spPr>
-        <p:txBody>
-          <a:bodyPr>
-            <a:normAutofit lnSpcReduction="10000"/>
-          </a:bodyPr>
-          <a:lstStyle/>
-          <a:p>
-            <a:r>
-              <a:rPr lang="en-US"/>
-              <a:t>PLSR validation plots (cant combine plots in R)</a:t>
-            </a:r>
-            <a:endParaRPr lang="en-US" dirty="0"/>
-          </a:p>
-        </p:txBody>
-      </p:sp>
       <p:grpSp>
         <p:nvGrpSpPr>
-          <p:cNvPr id="5" name="Group 4">
-            <a:extLst>
-              <a:ext uri="{FF2B5EF4-FFF2-40B4-BE49-F238E27FC236}">
-                <a16:creationId xmlns:a16="http://schemas.microsoft.com/office/drawing/2014/main" id="{52876BBC-A6B2-7598-E176-4C94254538B2}"/>
+          <p:cNvPr id="4" name="Group 3">
+            <a:extLst>
+              <a:ext uri="{FF2B5EF4-FFF2-40B4-BE49-F238E27FC236}">
+                <a16:creationId xmlns:a16="http://schemas.microsoft.com/office/drawing/2014/main" id="{B74A2EFC-FC66-3828-DDDA-576A9A8D7844}"/>
               </a:ext>
             </a:extLst>
           </p:cNvPr>
@@ -3554,18 +3614,18 @@
         </p:nvGrpSpPr>
         <p:grpSpPr>
           <a:xfrm>
-            <a:off x="2760994" y="685802"/>
-            <a:ext cx="6748126" cy="3022904"/>
-            <a:chOff x="2760994" y="685802"/>
-            <a:chExt cx="6748126" cy="3022904"/>
+            <a:off x="2209800" y="406400"/>
+            <a:ext cx="7772400" cy="6045199"/>
+            <a:chOff x="2209800" y="406400"/>
+            <a:chExt cx="7772400" cy="6045199"/>
           </a:xfrm>
         </p:grpSpPr>
         <p:pic>
           <p:nvPicPr>
-            <p:cNvPr id="2" name="Picture 1">
+            <p:cNvPr id="3" name="Picture 2">
               <a:extLst>
                 <a:ext uri="{FF2B5EF4-FFF2-40B4-BE49-F238E27FC236}">
-                  <a16:creationId xmlns:a16="http://schemas.microsoft.com/office/drawing/2014/main" id="{71ED49E5-DBF4-5179-7A2F-BEB9FB628E39}"/>
+                  <a16:creationId xmlns:a16="http://schemas.microsoft.com/office/drawing/2014/main" id="{1671EEF2-1AE9-274E-9988-285F4BD6384F}"/>
                 </a:ext>
               </a:extLst>
             </p:cNvPr>
@@ -3582,8 +3642,8 @@
           </p:blipFill>
           <p:spPr>
             <a:xfrm>
-              <a:off x="2760994" y="860901"/>
-              <a:ext cx="3335006" cy="2847805"/>
+              <a:off x="2209800" y="406400"/>
+              <a:ext cx="7772400" cy="6045199"/>
             </a:xfrm>
             <a:prstGeom prst="rect">
               <a:avLst/>
@@ -3592,10 +3652,10 @@
         </p:pic>
         <p:pic>
           <p:nvPicPr>
-            <p:cNvPr id="4" name="Picture 3">
+            <p:cNvPr id="14" name="Picture 13">
               <a:extLst>
                 <a:ext uri="{FF2B5EF4-FFF2-40B4-BE49-F238E27FC236}">
-                  <a16:creationId xmlns:a16="http://schemas.microsoft.com/office/drawing/2014/main" id="{518B7DDD-C103-663D-08A4-E43EB7B5B8D7}"/>
+                  <a16:creationId xmlns:a16="http://schemas.microsoft.com/office/drawing/2014/main" id="{97620366-6658-F6F6-89C4-44C5157DBA16}"/>
                 </a:ext>
               </a:extLst>
             </p:cNvPr>
@@ -3612,105 +3672,14 @@
           </p:blipFill>
           <p:spPr>
             <a:xfrm>
-              <a:off x="6174115" y="860901"/>
-              <a:ext cx="3335005" cy="2847805"/>
+              <a:off x="2209800" y="406400"/>
+              <a:ext cx="3886200" cy="3021831"/>
             </a:xfrm>
             <a:prstGeom prst="rect">
               <a:avLst/>
             </a:prstGeom>
           </p:spPr>
         </p:pic>
-        <p:grpSp>
-          <p:nvGrpSpPr>
-            <p:cNvPr id="13" name="Group 12">
-              <a:extLst>
-                <a:ext uri="{FF2B5EF4-FFF2-40B4-BE49-F238E27FC236}">
-                  <a16:creationId xmlns:a16="http://schemas.microsoft.com/office/drawing/2014/main" id="{C7202592-8701-F2B6-97AC-59D7D49488D3}"/>
-                </a:ext>
-              </a:extLst>
-            </p:cNvPr>
-            <p:cNvGrpSpPr/>
-            <p:nvPr/>
-          </p:nvGrpSpPr>
-          <p:grpSpPr>
-            <a:xfrm>
-              <a:off x="2943494" y="685802"/>
-              <a:ext cx="3532333" cy="356673"/>
-              <a:chOff x="1759394" y="685799"/>
-              <a:chExt cx="3738473" cy="369332"/>
-            </a:xfrm>
-          </p:grpSpPr>
-          <p:sp>
-            <p:nvSpPr>
-              <p:cNvPr id="8" name="TextBox 7">
-                <a:extLst>
-                  <a:ext uri="{FF2B5EF4-FFF2-40B4-BE49-F238E27FC236}">
-                    <a16:creationId xmlns:a16="http://schemas.microsoft.com/office/drawing/2014/main" id="{7E893FC4-4CDE-4803-3EA1-56E199AD5E07}"/>
-                  </a:ext>
-                </a:extLst>
-              </p:cNvPr>
-              <p:cNvSpPr txBox="1"/>
-              <p:nvPr/>
-            </p:nvSpPr>
-            <p:spPr>
-              <a:xfrm>
-                <a:off x="1759394" y="685799"/>
-                <a:ext cx="311304" cy="369332"/>
-              </a:xfrm>
-              <a:prstGeom prst="rect">
-                <a:avLst/>
-              </a:prstGeom>
-              <a:noFill/>
-            </p:spPr>
-            <p:txBody>
-              <a:bodyPr wrap="none" rtlCol="0">
-                <a:spAutoFit/>
-              </a:bodyPr>
-              <a:lstStyle/>
-              <a:p>
-                <a:r>
-                  <a:rPr lang="en-US" b="1" dirty="0"/>
-                  <a:t>a</a:t>
-                </a:r>
-              </a:p>
-            </p:txBody>
-          </p:sp>
-          <p:sp>
-            <p:nvSpPr>
-              <p:cNvPr id="9" name="TextBox 8">
-                <a:extLst>
-                  <a:ext uri="{FF2B5EF4-FFF2-40B4-BE49-F238E27FC236}">
-                    <a16:creationId xmlns:a16="http://schemas.microsoft.com/office/drawing/2014/main" id="{D2CAA15C-C9BD-A1FC-07C7-3473DD2BC5BE}"/>
-                  </a:ext>
-                </a:extLst>
-              </p:cNvPr>
-              <p:cNvSpPr txBox="1"/>
-              <p:nvPr/>
-            </p:nvSpPr>
-            <p:spPr>
-              <a:xfrm>
-                <a:off x="5178549" y="685799"/>
-                <a:ext cx="319318" cy="369332"/>
-              </a:xfrm>
-              <a:prstGeom prst="rect">
-                <a:avLst/>
-              </a:prstGeom>
-              <a:noFill/>
-            </p:spPr>
-            <p:txBody>
-              <a:bodyPr wrap="none" rtlCol="0">
-                <a:spAutoFit/>
-              </a:bodyPr>
-              <a:lstStyle/>
-              <a:p>
-                <a:r>
-                  <a:rPr lang="en-US" b="1" dirty="0"/>
-                  <a:t>b</a:t>
-                </a:r>
-              </a:p>
-            </p:txBody>
-          </p:sp>
-        </p:grpSp>
       </p:grpSp>
     </p:spTree>
     <p:extLst>

</xml_diff>